<commit_message>
Commit on Fri Feb  3 19:40:01 IST 2023
</commit_message>
<xml_diff>
--- a/paper_material/paper_02_resources/meeting-feb1/Chandra.pptx
+++ b/paper_material/paper_02_resources/meeting-feb1/Chandra.pptx
@@ -1038,6 +1038,8 @@
                     </a:srgbClr>
                   </a:outerShdw>
                 </a:effectLst>
+                <a:latin typeface="Liberation Mono" panose="02070409020205020404" charset="0"/>
+                <a:cs typeface="Liberation Mono" panose="02070409020205020404" charset="0"/>
               </a:defRPr>
             </a:lvl1pPr>
           </a:lstStyle>
@@ -1079,6 +1081,8 @@
                     <a:lumOff val="25000"/>
                   </a:schemeClr>
                 </a:solidFill>
+                <a:latin typeface="Liberation Mono" panose="02070409020205020404" charset="0"/>
+                <a:cs typeface="Liberation Mono" panose="02070409020205020404" charset="0"/>
               </a:defRPr>
             </a:lvl1pPr>
             <a:lvl2pPr>
@@ -1089,6 +1093,8 @@
                     <a:lumOff val="25000"/>
                   </a:schemeClr>
                 </a:solidFill>
+                <a:latin typeface="Liberation Mono" panose="02070409020205020404" charset="0"/>
+                <a:cs typeface="Liberation Mono" panose="02070409020205020404" charset="0"/>
               </a:defRPr>
             </a:lvl2pPr>
             <a:lvl3pPr>
@@ -1099,6 +1105,8 @@
                     <a:lumOff val="25000"/>
                   </a:schemeClr>
                 </a:solidFill>
+                <a:latin typeface="Liberation Mono" panose="02070409020205020404" charset="0"/>
+                <a:cs typeface="Liberation Mono" panose="02070409020205020404" charset="0"/>
               </a:defRPr>
             </a:lvl3pPr>
             <a:lvl4pPr>
@@ -1109,6 +1117,8 @@
                     <a:lumOff val="25000"/>
                   </a:schemeClr>
                 </a:solidFill>
+                <a:latin typeface="Liberation Mono" panose="02070409020205020404" charset="0"/>
+                <a:cs typeface="Liberation Mono" panose="02070409020205020404" charset="0"/>
               </a:defRPr>
             </a:lvl4pPr>
             <a:lvl5pPr>
@@ -1119,6 +1129,8 @@
                     <a:lumOff val="25000"/>
                   </a:schemeClr>
                 </a:solidFill>
+                <a:latin typeface="Liberation Mono" panose="02070409020205020404" charset="0"/>
+                <a:cs typeface="Liberation Mono" panose="02070409020205020404" charset="0"/>
               </a:defRPr>
             </a:lvl5pPr>
           </a:lstStyle>
@@ -1540,6 +1552,8 @@
                     </a:srgbClr>
                   </a:outerShdw>
                 </a:effectLst>
+                <a:latin typeface="Liberation Mono" panose="02070409020205020404" charset="0"/>
+                <a:cs typeface="Liberation Mono" panose="02070409020205020404" charset="0"/>
               </a:defRPr>
             </a:lvl1pPr>
           </a:lstStyle>
@@ -1584,6 +1598,8 @@
                     <a:lumOff val="25000"/>
                   </a:schemeClr>
                 </a:solidFill>
+                <a:latin typeface="Liberation Mono" panose="02070409020205020404" charset="0"/>
+                <a:cs typeface="Liberation Mono" panose="02070409020205020404" charset="0"/>
               </a:defRPr>
             </a:lvl1pPr>
             <a:lvl2pPr>
@@ -1597,6 +1613,8 @@
                     <a:lumOff val="25000"/>
                   </a:schemeClr>
                 </a:solidFill>
+                <a:latin typeface="Liberation Mono" panose="02070409020205020404" charset="0"/>
+                <a:cs typeface="Liberation Mono" panose="02070409020205020404" charset="0"/>
               </a:defRPr>
             </a:lvl2pPr>
             <a:lvl3pPr>
@@ -1610,6 +1628,8 @@
                     <a:lumOff val="25000"/>
                   </a:schemeClr>
                 </a:solidFill>
+                <a:latin typeface="Liberation Mono" panose="02070409020205020404" charset="0"/>
+                <a:cs typeface="Liberation Mono" panose="02070409020205020404" charset="0"/>
               </a:defRPr>
             </a:lvl3pPr>
             <a:lvl4pPr>
@@ -1623,6 +1643,8 @@
                     <a:lumOff val="25000"/>
                   </a:schemeClr>
                 </a:solidFill>
+                <a:latin typeface="Liberation Mono" panose="02070409020205020404" charset="0"/>
+                <a:cs typeface="Liberation Mono" panose="02070409020205020404" charset="0"/>
               </a:defRPr>
             </a:lvl4pPr>
             <a:lvl5pPr>
@@ -1636,6 +1658,8 @@
                     <a:lumOff val="25000"/>
                   </a:schemeClr>
                 </a:solidFill>
+                <a:latin typeface="Liberation Mono" panose="02070409020205020404" charset="0"/>
+                <a:cs typeface="Liberation Mono" panose="02070409020205020404" charset="0"/>
               </a:defRPr>
             </a:lvl5pPr>
           </a:lstStyle>
@@ -1717,6 +1741,8 @@
                     <a:lumOff val="25000"/>
                   </a:schemeClr>
                 </a:solidFill>
+                <a:latin typeface="Liberation Mono" panose="02070409020205020404" charset="0"/>
+                <a:cs typeface="Liberation Mono" panose="02070409020205020404" charset="0"/>
               </a:defRPr>
             </a:lvl1pPr>
             <a:lvl2pPr>
@@ -1730,6 +1756,8 @@
                     <a:lumOff val="25000"/>
                   </a:schemeClr>
                 </a:solidFill>
+                <a:latin typeface="Liberation Mono" panose="02070409020205020404" charset="0"/>
+                <a:cs typeface="Liberation Mono" panose="02070409020205020404" charset="0"/>
               </a:defRPr>
             </a:lvl2pPr>
             <a:lvl3pPr>
@@ -1743,6 +1771,8 @@
                     <a:lumOff val="25000"/>
                   </a:schemeClr>
                 </a:solidFill>
+                <a:latin typeface="Liberation Mono" panose="02070409020205020404" charset="0"/>
+                <a:cs typeface="Liberation Mono" panose="02070409020205020404" charset="0"/>
               </a:defRPr>
             </a:lvl3pPr>
             <a:lvl4pPr>
@@ -1756,6 +1786,8 @@
                     <a:lumOff val="25000"/>
                   </a:schemeClr>
                 </a:solidFill>
+                <a:latin typeface="Liberation Mono" panose="02070409020205020404" charset="0"/>
+                <a:cs typeface="Liberation Mono" panose="02070409020205020404" charset="0"/>
               </a:defRPr>
             </a:lvl4pPr>
             <a:lvl5pPr>
@@ -1769,6 +1801,8 @@
                     <a:lumOff val="25000"/>
                   </a:schemeClr>
                 </a:solidFill>
+                <a:latin typeface="Liberation Mono" panose="02070409020205020404" charset="0"/>
+                <a:cs typeface="Liberation Mono" panose="02070409020205020404" charset="0"/>
               </a:defRPr>
             </a:lvl5pPr>
           </a:lstStyle>
@@ -3745,6 +3779,24 @@
           <a:bodyPr/>
           <a:p>
             <a:r>
+              <a:rPr lang="en-IN" altLang="en-US">
+                <a:sym typeface="+mn-ea"/>
+              </a:rPr>
+              <a:t>Present the name and coordinates (and other vital properties) as a table in the paper (top 100 for majority class and above (3 sigma) for minority class).</a:t>
+            </a:r>
+            <a:endParaRPr lang="en-IN" altLang="en-US"/>
+          </a:p>
+          <a:p>
+            <a:r>
+              <a:rPr lang="en-IN" altLang="en-US">
+                <a:sym typeface="+mn-ea"/>
+              </a:rPr>
+              <a:t>Present online portal (or via CDS) for MW data and classification sharing. </a:t>
+            </a:r>
+            <a:endParaRPr lang="en-IN" altLang="en-US"/>
+          </a:p>
+          <a:p>
+            <a:r>
               <a:rPr lang="en-IN" altLang="en-US"/>
               <a:t>Discuss the properties of newly identified sources class-wise.</a:t>
             </a:r>
@@ -3758,17 +3810,6 @@
             <a:endParaRPr lang="en-IN" altLang="en-US"/>
           </a:p>
           <a:p>
-            <a:r>
-              <a:rPr lang="en-IN" altLang="en-US"/>
-              <a:t>Present the name and coordinates (and other vital properties) as a table in the paper (top 100 for majority class and above (3 sigma) for minority class).</a:t>
-            </a:r>
-            <a:endParaRPr lang="en-IN" altLang="en-US"/>
-          </a:p>
-          <a:p>
-            <a:r>
-              <a:rPr lang="en-IN" altLang="en-US"/>
-              <a:t>Present online portal (or via CDS) for MW data and classification sharing. </a:t>
-            </a:r>
             <a:endParaRPr lang="en-IN" altLang="en-US"/>
           </a:p>
         </p:txBody>
@@ -3883,8 +3924,8 @@
         </p:blipFill>
         <p:spPr>
           <a:xfrm>
-            <a:off x="6854190" y="831850"/>
-            <a:ext cx="5175885" cy="4524375"/>
+            <a:off x="6961505" y="914400"/>
+            <a:ext cx="5068570" cy="4431030"/>
           </a:xfrm>
           <a:prstGeom prst="rect">
             <a:avLst/>
@@ -4009,8 +4050,8 @@
         </p:blipFill>
         <p:spPr>
           <a:xfrm>
-            <a:off x="4766310" y="2604135"/>
-            <a:ext cx="6877050" cy="2454275"/>
+            <a:off x="4165600" y="2389505"/>
+            <a:ext cx="7477760" cy="2668905"/>
           </a:xfrm>
           <a:prstGeom prst="rect">
             <a:avLst/>
@@ -4067,9 +4108,16 @@
             <p:ph idx="1"/>
           </p:nvPr>
         </p:nvSpPr>
-        <p:spPr/>
-        <p:txBody>
-          <a:bodyPr/>
+        <p:spPr>
+          <a:xfrm>
+            <a:off x="647700" y="1519555"/>
+            <a:ext cx="10515600" cy="4657725"/>
+          </a:xfrm>
+        </p:spPr>
+        <p:txBody>
+          <a:bodyPr>
+            <a:normAutofit lnSpcReduction="20000"/>
+          </a:bodyPr>
           <a:p>
             <a:r>
               <a:rPr lang="en-IN" altLang="en-US"/>
@@ -4090,6 +4138,22 @@
             <a:r>
               <a:rPr lang="en-IN" altLang="en-US"/>
               <a:t>KS and KP statistic for feature histogram</a:t>
+            </a:r>
+            <a:endParaRPr lang="en-IN" altLang="en-US"/>
+          </a:p>
+          <a:p>
+            <a:pPr lvl="1"/>
+            <a:r>
+              <a:rPr lang="en-IN" altLang="en-US"/>
+              <a:t>variability histogram, selected based on variability index</a:t>
+            </a:r>
+            <a:endParaRPr lang="en-IN" altLang="en-US"/>
+          </a:p>
+          <a:p>
+            <a:pPr lvl="2"/>
+            <a:r>
+              <a:rPr lang="en-IN" altLang="en-US" sz="1600"/>
+              <a:t>Comparison of variability histogram</a:t>
             </a:r>
             <a:endParaRPr lang="en-IN" altLang="en-US"/>
           </a:p>

</xml_diff>